<commit_message>
PPTX workssssss part 2
</commit_message>
<xml_diff>
--- a/backend/data/0ef2e0f5-d61a-4687-a0ce-69b4c3fd9ec6/Exploring_the_Concept_of_Genius.pptx
+++ b/backend/data/0ef2e0f5-d61a-4687-a0ce-69b4c3fd9ec6/Exploring_the_Concept_of_Genius.pptx
@@ -3111,7 +3111,7 @@
         </p:nvSpPr>
         <p:spPr>
           <a:xfrm>
-            <a:off x="1016000" y="3733800"/>
+            <a:off x="1016000" y="2895600"/>
             <a:ext cx="5257800" cy="609600"/>
           </a:xfrm>
           <a:prstGeom prst="rect">
@@ -3153,7 +3153,7 @@
         </p:nvSpPr>
         <p:spPr>
           <a:xfrm>
-            <a:off x="1016000" y="4648200"/>
+            <a:off x="1016000" y="5486400"/>
             <a:ext cx="6731000" cy="762000"/>
           </a:xfrm>
           <a:prstGeom prst="rect">
@@ -3189,7 +3189,7 @@
       </p:sp>
       <p:pic>
         <p:nvPicPr>
-          <p:cNvPr id="4" name="Picture 3" descr="041522e5-f6a9-492e-9586-2b3b176dae42.png"/>
+          <p:cNvPr id="4" name="Picture 3" descr="19b1b3d3-a1b0-4dfb-b940-d08fdabdbe5e.png"/>
           <p:cNvPicPr>
             <a:picLocks noChangeAspect="1"/>
           </p:cNvPicPr>
@@ -6311,7 +6311,7 @@
       </p:sp>
       <p:pic>
         <p:nvPicPr>
-          <p:cNvPr id="4" name="Picture 3" descr="263f15f4-3828-4fc0-88a7-b9d7081b3593.png"/>
+          <p:cNvPr id="4" name="Picture 3" descr="e6033164-0a00-454a-b68f-d51480f4e3cc.png"/>
           <p:cNvPicPr>
             <a:picLocks noChangeAspect="1"/>
           </p:cNvPicPr>
@@ -6471,7 +6471,7 @@
       </p:sp>
       <p:pic>
         <p:nvPicPr>
-          <p:cNvPr id="8" name="Picture 7" descr="db59b2fc-16f7-426b-9898-a3fb9964fd76.png"/>
+          <p:cNvPr id="8" name="Picture 7" descr="0358f612-e920-4890-86ae-a3c1ce007d16.png"/>
           <p:cNvPicPr>
             <a:picLocks noChangeAspect="1"/>
           </p:cNvPicPr>
@@ -6631,7 +6631,7 @@
       </p:sp>
       <p:pic>
         <p:nvPicPr>
-          <p:cNvPr id="12" name="Picture 11" descr="fd62ee98-cde5-404c-9dc6-e685cf2a4c70.png"/>
+          <p:cNvPr id="12" name="Picture 11" descr="6bfe7cfa-2ee9-41f2-a6ca-3cbc5a3aff77.png"/>
           <p:cNvPicPr>
             <a:picLocks noChangeAspect="1"/>
           </p:cNvPicPr>
@@ -6804,7 +6804,7 @@
         </p:nvSpPr>
         <p:spPr>
           <a:xfrm>
-            <a:off x="1016000" y="3733800"/>
+            <a:off x="1016000" y="2895600"/>
             <a:ext cx="6629400" cy="609600"/>
           </a:xfrm>
           <a:prstGeom prst="rect">
@@ -6846,7 +6846,7 @@
         </p:nvSpPr>
         <p:spPr>
           <a:xfrm>
-            <a:off x="1016000" y="4648200"/>
+            <a:off x="1016000" y="5486400"/>
             <a:ext cx="6731000" cy="762000"/>
           </a:xfrm>
           <a:prstGeom prst="rect">
@@ -6882,7 +6882,7 @@
       </p:sp>
       <p:pic>
         <p:nvPicPr>
-          <p:cNvPr id="4" name="Picture 3" descr="19028eec-af46-4406-b71b-a1c91b3da817.png"/>
+          <p:cNvPr id="4" name="Picture 3" descr="3bfe5744-6bfb-4555-98cc-7516fb20ad69.png"/>
           <p:cNvPicPr>
             <a:picLocks noChangeAspect="1"/>
           </p:cNvPicPr>

</xml_diff>